<commit_message>
sửa lại cái ppt bài 4
</commit_message>
<xml_diff>
--- a/Bai_4/báo cáo/báo cáo bài 4.pptx
+++ b/Bai_4/báo cáo/báo cáo bài 4.pptx
@@ -113,6 +113,11 @@
       </a:defRPr>
     </a:lvl9pPr>
   </p:defaultTextStyle>
+  <p:extLst>
+    <p:ext uri="{EFAFB233-063F-42B5-8137-9DF3F51BA10A}">
+      <p15:sldGuideLst xmlns:p15="http://schemas.microsoft.com/office/powerpoint/2012/main"/>
+    </p:ext>
+  </p:extLst>
 </p:presentation>
 </file>
 
@@ -198,7 +203,7 @@
           <a:p>
             <a:fld id="{E8A86932-8EBF-4BFD-8E72-BDF5280B783E}" type="datetimeFigureOut">
               <a:rPr lang="en-US" smtClean="0"/>
-              <a:t>10/6/2025</a:t>
+              <a:t>10/8/2025</a:t>
             </a:fld>
             <a:endParaRPr lang="en-US"/>
           </a:p>
@@ -612,7 +617,7 @@
           <a:p>
             <a:fld id="{72485C3C-2B77-4E27-AB1C-7EEA5DEF2134}" type="datetimeFigureOut">
               <a:rPr lang="en-US" smtClean="0"/>
-              <a:t>10/6/2025</a:t>
+              <a:t>10/8/2025</a:t>
             </a:fld>
             <a:endParaRPr lang="en-US"/>
           </a:p>
@@ -810,7 +815,7 @@
           <a:p>
             <a:fld id="{72485C3C-2B77-4E27-AB1C-7EEA5DEF2134}" type="datetimeFigureOut">
               <a:rPr lang="en-US" smtClean="0"/>
-              <a:t>10/6/2025</a:t>
+              <a:t>10/8/2025</a:t>
             </a:fld>
             <a:endParaRPr lang="en-US"/>
           </a:p>
@@ -1018,7 +1023,7 @@
           <a:p>
             <a:fld id="{72485C3C-2B77-4E27-AB1C-7EEA5DEF2134}" type="datetimeFigureOut">
               <a:rPr lang="en-US" smtClean="0"/>
-              <a:t>10/6/2025</a:t>
+              <a:t>10/8/2025</a:t>
             </a:fld>
             <a:endParaRPr lang="en-US"/>
           </a:p>
@@ -1216,7 +1221,7 @@
           <a:p>
             <a:fld id="{72485C3C-2B77-4E27-AB1C-7EEA5DEF2134}" type="datetimeFigureOut">
               <a:rPr lang="en-US" smtClean="0"/>
-              <a:t>10/6/2025</a:t>
+              <a:t>10/8/2025</a:t>
             </a:fld>
             <a:endParaRPr lang="en-US"/>
           </a:p>
@@ -1491,7 +1496,7 @@
           <a:p>
             <a:fld id="{72485C3C-2B77-4E27-AB1C-7EEA5DEF2134}" type="datetimeFigureOut">
               <a:rPr lang="en-US" smtClean="0"/>
-              <a:t>10/6/2025</a:t>
+              <a:t>10/8/2025</a:t>
             </a:fld>
             <a:endParaRPr lang="en-US"/>
           </a:p>
@@ -1756,7 +1761,7 @@
           <a:p>
             <a:fld id="{72485C3C-2B77-4E27-AB1C-7EEA5DEF2134}" type="datetimeFigureOut">
               <a:rPr lang="en-US" smtClean="0"/>
-              <a:t>10/6/2025</a:t>
+              <a:t>10/8/2025</a:t>
             </a:fld>
             <a:endParaRPr lang="en-US"/>
           </a:p>
@@ -2168,7 +2173,7 @@
           <a:p>
             <a:fld id="{72485C3C-2B77-4E27-AB1C-7EEA5DEF2134}" type="datetimeFigureOut">
               <a:rPr lang="en-US" smtClean="0"/>
-              <a:t>10/6/2025</a:t>
+              <a:t>10/8/2025</a:t>
             </a:fld>
             <a:endParaRPr lang="en-US"/>
           </a:p>
@@ -2309,7 +2314,7 @@
           <a:p>
             <a:fld id="{72485C3C-2B77-4E27-AB1C-7EEA5DEF2134}" type="datetimeFigureOut">
               <a:rPr lang="en-US" smtClean="0"/>
-              <a:t>10/6/2025</a:t>
+              <a:t>10/8/2025</a:t>
             </a:fld>
             <a:endParaRPr lang="en-US"/>
           </a:p>
@@ -2422,7 +2427,7 @@
           <a:p>
             <a:fld id="{72485C3C-2B77-4E27-AB1C-7EEA5DEF2134}" type="datetimeFigureOut">
               <a:rPr lang="en-US" smtClean="0"/>
-              <a:t>10/6/2025</a:t>
+              <a:t>10/8/2025</a:t>
             </a:fld>
             <a:endParaRPr lang="en-US"/>
           </a:p>
@@ -2733,7 +2738,7 @@
           <a:p>
             <a:fld id="{72485C3C-2B77-4E27-AB1C-7EEA5DEF2134}" type="datetimeFigureOut">
               <a:rPr lang="en-US" smtClean="0"/>
-              <a:t>10/6/2025</a:t>
+              <a:t>10/8/2025</a:t>
             </a:fld>
             <a:endParaRPr lang="en-US"/>
           </a:p>
@@ -3021,7 +3026,7 @@
           <a:p>
             <a:fld id="{72485C3C-2B77-4E27-AB1C-7EEA5DEF2134}" type="datetimeFigureOut">
               <a:rPr lang="en-US" smtClean="0"/>
-              <a:t>10/6/2025</a:t>
+              <a:t>10/8/2025</a:t>
             </a:fld>
             <a:endParaRPr lang="en-US"/>
           </a:p>
@@ -3262,7 +3267,7 @@
           <a:p>
             <a:fld id="{72485C3C-2B77-4E27-AB1C-7EEA5DEF2134}" type="datetimeFigureOut">
               <a:rPr lang="en-US" smtClean="0"/>
-              <a:t>10/6/2025</a:t>
+              <a:t>10/8/2025</a:t>
             </a:fld>
             <a:endParaRPr lang="en-US"/>
           </a:p>
@@ -5826,7 +5831,7 @@
         <p:spPr>
           <a:xfrm>
             <a:off x="1474839" y="5614219"/>
-            <a:ext cx="10099047" cy="369332"/>
+            <a:ext cx="10222478" cy="369332"/>
           </a:xfrm>
           <a:prstGeom prst="rect">
             <a:avLst/>
@@ -5925,7 +5930,7 @@
             </a:r>
             <a:r>
               <a:rPr lang="en-US" dirty="0"/>
-              <a:t> eps = 25. </a:t>
+              <a:t> eps = 0.25. </a:t>
             </a:r>
             <a:r>
               <a:rPr lang="en-US" dirty="0" err="1"/>

</xml_diff>